<commit_message>
pdf slides and requirements.txt
</commit_message>
<xml_diff>
--- a/ppt/inference and influences.pptx
+++ b/ppt/inference and influences.pptx
@@ -205,7 +205,7 @@
           <a:p>
             <a:fld id="{5947836D-F074-F845-A3BE-15D1060292DE}" type="datetimeFigureOut">
               <a:rPr lang="en-GB" smtClean="0"/>
-              <a:t>28/09/2025</a:t>
+              <a:t>29/09/2025</a:t>
             </a:fld>
             <a:endParaRPr lang="en-GB"/>
           </a:p>
@@ -478,6 +478,90 @@
   <p:cSld>
     <p:spTree>
       <p:nvGrpSpPr>
+        <p:cNvPr id="1" name=""/>
+        <p:cNvGrpSpPr/>
+        <p:nvPr/>
+      </p:nvGrpSpPr>
+      <p:grpSpPr>
+        <a:xfrm>
+          <a:off x="0" y="0"/>
+          <a:ext cx="0" cy="0"/>
+          <a:chOff x="0" y="0"/>
+          <a:chExt cx="0" cy="0"/>
+        </a:xfrm>
+      </p:grpSpPr>
+      <p:sp>
+        <p:nvSpPr>
+          <p:cNvPr id="2" name="Slide Image Placeholder 1"/>
+          <p:cNvSpPr>
+            <a:spLocks noGrp="1" noRot="1" noChangeAspect="1"/>
+          </p:cNvSpPr>
+          <p:nvPr>
+            <p:ph type="sldImg"/>
+          </p:nvPr>
+        </p:nvSpPr>
+        <p:spPr/>
+      </p:sp>
+      <p:sp>
+        <p:nvSpPr>
+          <p:cNvPr id="3" name="Notes Placeholder 2"/>
+          <p:cNvSpPr>
+            <a:spLocks noGrp="1"/>
+          </p:cNvSpPr>
+          <p:nvPr>
+            <p:ph type="body" idx="1"/>
+          </p:nvPr>
+        </p:nvSpPr>
+        <p:spPr/>
+        <p:txBody>
+          <a:bodyPr/>
+          <a:lstStyle/>
+          <a:p>
+            <a:endParaRPr lang="en-GB"/>
+          </a:p>
+        </p:txBody>
+      </p:sp>
+      <p:sp>
+        <p:nvSpPr>
+          <p:cNvPr id="4" name="Slide Number Placeholder 3"/>
+          <p:cNvSpPr>
+            <a:spLocks noGrp="1"/>
+          </p:cNvSpPr>
+          <p:nvPr>
+            <p:ph type="sldNum" sz="quarter" idx="5"/>
+          </p:nvPr>
+        </p:nvSpPr>
+        <p:spPr/>
+        <p:txBody>
+          <a:bodyPr/>
+          <a:lstStyle/>
+          <a:p>
+            <a:fld id="{14EB6076-F58C-7040-AD28-1DC03F1E9F5D}" type="slidenum">
+              <a:rPr lang="en-GB" smtClean="0"/>
+              <a:t>1</a:t>
+            </a:fld>
+            <a:endParaRPr lang="en-GB"/>
+          </a:p>
+        </p:txBody>
+      </p:sp>
+    </p:spTree>
+    <p:extLst>
+      <p:ext uri="{BB962C8B-B14F-4D97-AF65-F5344CB8AC3E}">
+        <p14:creationId xmlns:p14="http://schemas.microsoft.com/office/powerpoint/2010/main" val="3779043853"/>
+      </p:ext>
+    </p:extLst>
+  </p:cSld>
+  <p:clrMapOvr>
+    <a:masterClrMapping/>
+  </p:clrMapOvr>
+</p:notes>
+</file>
+
+<file path=ppt/notesSlides/notesSlide2.xml><?xml version="1.0" encoding="utf-8"?>
+<p:notes xmlns:a="http://schemas.openxmlformats.org/drawingml/2006/main" xmlns:r="http://schemas.openxmlformats.org/officeDocument/2006/relationships" xmlns:p="http://schemas.openxmlformats.org/presentationml/2006/main">
+  <p:cSld>
+    <p:spTree>
+      <p:nvGrpSpPr>
         <p:cNvPr id="1" name="">
           <a:extLst>
             <a:ext uri="{FF2B5EF4-FFF2-40B4-BE49-F238E27FC236}">
@@ -581,7 +665,7 @@
 </p:notes>
 </file>
 
-<file path=ppt/notesSlides/notesSlide2.xml><?xml version="1.0" encoding="utf-8"?>
+<file path=ppt/notesSlides/notesSlide3.xml><?xml version="1.0" encoding="utf-8"?>
 <p:notes xmlns:a="http://schemas.openxmlformats.org/drawingml/2006/main" xmlns:r="http://schemas.openxmlformats.org/officeDocument/2006/relationships" xmlns:p="http://schemas.openxmlformats.org/presentationml/2006/main">
   <p:cSld>
     <p:spTree>
@@ -689,7 +773,7 @@
 </p:notes>
 </file>
 
-<file path=ppt/notesSlides/notesSlide3.xml><?xml version="1.0" encoding="utf-8"?>
+<file path=ppt/notesSlides/notesSlide4.xml><?xml version="1.0" encoding="utf-8"?>
 <p:notes xmlns:a="http://schemas.openxmlformats.org/drawingml/2006/main" xmlns:r="http://schemas.openxmlformats.org/officeDocument/2006/relationships" xmlns:p="http://schemas.openxmlformats.org/presentationml/2006/main">
   <p:cSld>
     <p:spTree>
@@ -797,7 +881,7 @@
 </p:notes>
 </file>
 
-<file path=ppt/notesSlides/notesSlide4.xml><?xml version="1.0" encoding="utf-8"?>
+<file path=ppt/notesSlides/notesSlide5.xml><?xml version="1.0" encoding="utf-8"?>
 <p:notes xmlns:a="http://schemas.openxmlformats.org/drawingml/2006/main" xmlns:r="http://schemas.openxmlformats.org/officeDocument/2006/relationships" xmlns:p="http://schemas.openxmlformats.org/presentationml/2006/main">
   <p:cSld>
     <p:spTree>
@@ -905,7 +989,7 @@
 </p:notes>
 </file>
 
-<file path=ppt/notesSlides/notesSlide5.xml><?xml version="1.0" encoding="utf-8"?>
+<file path=ppt/notesSlides/notesSlide6.xml><?xml version="1.0" encoding="utf-8"?>
 <p:notes xmlns:a="http://schemas.openxmlformats.org/drawingml/2006/main" xmlns:r="http://schemas.openxmlformats.org/officeDocument/2006/relationships" xmlns:p="http://schemas.openxmlformats.org/presentationml/2006/main">
   <p:cSld>
     <p:spTree>
@@ -1013,7 +1097,7 @@
 </p:notes>
 </file>
 
-<file path=ppt/notesSlides/notesSlide6.xml><?xml version="1.0" encoding="utf-8"?>
+<file path=ppt/notesSlides/notesSlide7.xml><?xml version="1.0" encoding="utf-8"?>
 <p:notes xmlns:a="http://schemas.openxmlformats.org/drawingml/2006/main" xmlns:r="http://schemas.openxmlformats.org/officeDocument/2006/relationships" xmlns:p="http://schemas.openxmlformats.org/presentationml/2006/main">
   <p:cSld>
     <p:spTree>
@@ -1270,7 +1354,7 @@
           <a:p>
             <a:fld id="{92CEF234-FA5E-F74A-AF61-81C74A5AFCF5}" type="datetimeFigureOut">
               <a:rPr lang="en-GB" smtClean="0"/>
-              <a:t>28/09/2025</a:t>
+              <a:t>29/09/2025</a:t>
             </a:fld>
             <a:endParaRPr lang="en-GB"/>
           </a:p>
@@ -1470,7 +1554,7 @@
           <a:p>
             <a:fld id="{92CEF234-FA5E-F74A-AF61-81C74A5AFCF5}" type="datetimeFigureOut">
               <a:rPr lang="en-GB" smtClean="0"/>
-              <a:t>28/09/2025</a:t>
+              <a:t>29/09/2025</a:t>
             </a:fld>
             <a:endParaRPr lang="en-GB"/>
           </a:p>
@@ -1680,7 +1764,7 @@
           <a:p>
             <a:fld id="{92CEF234-FA5E-F74A-AF61-81C74A5AFCF5}" type="datetimeFigureOut">
               <a:rPr lang="en-GB" smtClean="0"/>
-              <a:t>28/09/2025</a:t>
+              <a:t>29/09/2025</a:t>
             </a:fld>
             <a:endParaRPr lang="en-GB"/>
           </a:p>
@@ -1880,7 +1964,7 @@
           <a:p>
             <a:fld id="{92CEF234-FA5E-F74A-AF61-81C74A5AFCF5}" type="datetimeFigureOut">
               <a:rPr lang="en-GB" smtClean="0"/>
-              <a:t>28/09/2025</a:t>
+              <a:t>29/09/2025</a:t>
             </a:fld>
             <a:endParaRPr lang="en-GB"/>
           </a:p>
@@ -2156,7 +2240,7 @@
           <a:p>
             <a:fld id="{92CEF234-FA5E-F74A-AF61-81C74A5AFCF5}" type="datetimeFigureOut">
               <a:rPr lang="en-GB" smtClean="0"/>
-              <a:t>28/09/2025</a:t>
+              <a:t>29/09/2025</a:t>
             </a:fld>
             <a:endParaRPr lang="en-GB"/>
           </a:p>
@@ -2424,7 +2508,7 @@
           <a:p>
             <a:fld id="{92CEF234-FA5E-F74A-AF61-81C74A5AFCF5}" type="datetimeFigureOut">
               <a:rPr lang="en-GB" smtClean="0"/>
-              <a:t>28/09/2025</a:t>
+              <a:t>29/09/2025</a:t>
             </a:fld>
             <a:endParaRPr lang="en-GB"/>
           </a:p>
@@ -2839,7 +2923,7 @@
           <a:p>
             <a:fld id="{92CEF234-FA5E-F74A-AF61-81C74A5AFCF5}" type="datetimeFigureOut">
               <a:rPr lang="en-GB" smtClean="0"/>
-              <a:t>28/09/2025</a:t>
+              <a:t>29/09/2025</a:t>
             </a:fld>
             <a:endParaRPr lang="en-GB"/>
           </a:p>
@@ -2981,7 +3065,7 @@
           <a:p>
             <a:fld id="{92CEF234-FA5E-F74A-AF61-81C74A5AFCF5}" type="datetimeFigureOut">
               <a:rPr lang="en-GB" smtClean="0"/>
-              <a:t>28/09/2025</a:t>
+              <a:t>29/09/2025</a:t>
             </a:fld>
             <a:endParaRPr lang="en-GB"/>
           </a:p>
@@ -3094,7 +3178,7 @@
           <a:p>
             <a:fld id="{92CEF234-FA5E-F74A-AF61-81C74A5AFCF5}" type="datetimeFigureOut">
               <a:rPr lang="en-GB" smtClean="0"/>
-              <a:t>28/09/2025</a:t>
+              <a:t>29/09/2025</a:t>
             </a:fld>
             <a:endParaRPr lang="en-GB"/>
           </a:p>
@@ -3407,7 +3491,7 @@
           <a:p>
             <a:fld id="{92CEF234-FA5E-F74A-AF61-81C74A5AFCF5}" type="datetimeFigureOut">
               <a:rPr lang="en-GB" smtClean="0"/>
-              <a:t>28/09/2025</a:t>
+              <a:t>29/09/2025</a:t>
             </a:fld>
             <a:endParaRPr lang="en-GB"/>
           </a:p>
@@ -3696,7 +3780,7 @@
           <a:p>
             <a:fld id="{92CEF234-FA5E-F74A-AF61-81C74A5AFCF5}" type="datetimeFigureOut">
               <a:rPr lang="en-GB" smtClean="0"/>
-              <a:t>28/09/2025</a:t>
+              <a:t>29/09/2025</a:t>
             </a:fld>
             <a:endParaRPr lang="en-GB"/>
           </a:p>
@@ -3939,7 +4023,7 @@
           <a:p>
             <a:fld id="{92CEF234-FA5E-F74A-AF61-81C74A5AFCF5}" type="datetimeFigureOut">
               <a:rPr lang="en-GB" smtClean="0"/>
-              <a:t>28/09/2025</a:t>
+              <a:t>29/09/2025</a:t>
             </a:fld>
             <a:endParaRPr lang="en-GB"/>
           </a:p>
@@ -4370,8 +4454,8 @@
         </p:nvSpPr>
         <p:spPr>
           <a:xfrm>
-            <a:off x="0" y="2090172"/>
-            <a:ext cx="12192000" cy="2677656"/>
+            <a:off x="0" y="2305615"/>
+            <a:ext cx="12192000" cy="2246769"/>
           </a:xfrm>
           <a:prstGeom prst="rect">
             <a:avLst/>
@@ -4404,15 +4488,8 @@
                 <a:latin typeface="Courier New" panose="02070309020205020404" pitchFamily="49" charset="0"/>
                 <a:cs typeface="Courier New" panose="02070309020205020404" pitchFamily="49" charset="0"/>
               </a:rPr>
-              <a:t>“I want to achieve this objective, while doing/not doing this and that. How?”</a:t>
+              <a:t>“I want to achieve an objective while doing something with custom constraints. How?”</a:t>
             </a:r>
-          </a:p>
-          <a:p>
-            <a:pPr algn="ctr"/>
-            <a:endParaRPr lang="en-US" sz="2800" dirty="0">
-              <a:latin typeface="Courier New" panose="02070309020205020404" pitchFamily="49" charset="0"/>
-              <a:cs typeface="Courier New" panose="02070309020205020404" pitchFamily="49" charset="0"/>
-            </a:endParaRPr>
           </a:p>
         </p:txBody>
       </p:sp>
@@ -4431,7 +4508,7 @@
           <p:nvPr/>
         </p:nvPicPr>
         <p:blipFill>
-          <a:blip r:embed="rId2"/>
+          <a:blip r:embed="rId3"/>
           <a:stretch>
             <a:fillRect/>
           </a:stretch>
@@ -4639,7 +4716,7 @@
           <a:p>
             <a:r>
               <a:rPr lang="en-US" dirty="0"/>
-              <a:t>Mr. Bolas wants to burn more calories because he knows that, with age, weight tends to increase.</a:t>
+              <a:t>Mr. Nicol Bolas wants to burn more calories because he has heard that, with age, body weight tends to increase.</a:t>
             </a:r>
           </a:p>
           <a:p>
@@ -4648,7 +4725,7 @@
           <a:p>
             <a:r>
               <a:rPr lang="en-US" dirty="0"/>
-              <a:t>He knows that taking walks can be beneficial for his health; however, he also does not feel comfortable walking for too long due to his age, and wants to set a regular plan. He then resolves to walk to and from his workplace every day, as well as take similar walks on weekends.</a:t>
+              <a:t>He wants to set a regular walking plan because he knows that it can be beneficial for his health; however, he also does not feel comfortable walking for too long due to his age. He then resolves to walk to and from his workplace every day, as well as take similar walks on weekends.</a:t>
             </a:r>
           </a:p>
           <a:p>
@@ -4669,8 +4746,8 @@
               <a:t>He sets a goal for himself, but will this plan work?  He asks </a:t>
             </a:r>
             <a:r>
-              <a:rPr lang="en-US" i="1" dirty="0"/>
-              <a:t>Fitness Buddy</a:t>
+              <a:rPr lang="en-US" i="1" dirty="0" err="1"/>
+              <a:t>FitBuddy</a:t>
             </a:r>
             <a:r>
               <a:rPr lang="en-US" dirty="0"/>
@@ -4887,8 +4964,8 @@
         </p:nvSpPr>
         <p:spPr>
           <a:xfrm>
-            <a:off x="1940557" y="122502"/>
-            <a:ext cx="2121093" cy="1714380"/>
+            <a:off x="1940557" y="244939"/>
+            <a:ext cx="2060179" cy="1298882"/>
           </a:xfrm>
           <a:prstGeom prst="rect">
             <a:avLst/>
@@ -4913,25 +4990,6 @@
             <a:r>
               <a:rPr lang="en-GB" dirty="0"/>
               <a:t>Nicol Bolas</a:t>
-            </a:r>
-          </a:p>
-          <a:p>
-            <a:pPr>
-              <a:lnSpc>
-                <a:spcPct val="150000"/>
-              </a:lnSpc>
-            </a:pPr>
-            <a:r>
-              <a:rPr lang="en-GB" b="1" dirty="0" err="1"/>
-              <a:t>pid</a:t>
-            </a:r>
-            <a:r>
-              <a:rPr lang="en-GB" b="1" dirty="0"/>
-              <a:t>: </a:t>
-            </a:r>
-            <a:r>
-              <a:rPr lang="en-GB" dirty="0"/>
-              <a:t>6</a:t>
             </a:r>
           </a:p>
           <a:p>
@@ -4980,7 +5038,7 @@
         </p:nvSpPr>
         <p:spPr>
           <a:xfrm>
-            <a:off x="4566583" y="122502"/>
+            <a:off x="4566583" y="244939"/>
             <a:ext cx="3344826" cy="1298882"/>
           </a:xfrm>
           <a:prstGeom prst="rect">
@@ -5059,7 +5117,7 @@
         </p:nvSpPr>
         <p:spPr>
           <a:xfrm>
-            <a:off x="8416343" y="122502"/>
+            <a:off x="8416343" y="244939"/>
             <a:ext cx="2983958" cy="883383"/>
           </a:xfrm>
           <a:prstGeom prst="rect">
@@ -12121,8 +12179,8 @@
         </p:nvSpPr>
         <p:spPr>
           <a:xfrm>
-            <a:off x="0" y="2255252"/>
-            <a:ext cx="12192000" cy="877163"/>
+            <a:off x="0" y="2369304"/>
+            <a:ext cx="12192000" cy="830997"/>
           </a:xfrm>
           <a:prstGeom prst="rect">
             <a:avLst/>
@@ -12137,19 +12195,19 @@
           <a:p>
             <a:pPr algn="ctr"/>
             <a:r>
-              <a:rPr lang="en-GB" sz="1700" dirty="0"/>
-              <a:t>As a starting point, let’s assume the above data and the following table as the baseline for Mr. Bolas’ health and fitness status.</a:t>
+              <a:rPr lang="en-GB" sz="1600" dirty="0"/>
+              <a:t>As a starting point, let’s assume the data above and the table below as the baseline for Mr. Bolas’ health and fitness status.</a:t>
             </a:r>
           </a:p>
           <a:p>
             <a:pPr algn="ctr"/>
-            <a:endParaRPr lang="en-GB" sz="1700" dirty="0"/>
+            <a:endParaRPr lang="en-GB" sz="1600" dirty="0"/>
           </a:p>
           <a:p>
             <a:pPr algn="ctr"/>
             <a:r>
-              <a:rPr lang="en-GB" sz="1700" dirty="0"/>
-              <a:t>Also, let’s assume the causal graph in the following slide as the true causal relationships between the variables.</a:t>
+              <a:rPr lang="en-GB" sz="1600" dirty="0"/>
+              <a:t>Also, let’s assume that the causal graph in the following slide accurately represents the causal relationships between the variables.</a:t>
             </a:r>
           </a:p>
         </p:txBody>
@@ -12534,7 +12592,7 @@
             </a:pPr>
             <a:r>
               <a:rPr lang="en-GB" dirty="0"/>
-              <a:t>In fact, if we compute the yearly average, we can observe that the average calorie consumption  very slightly decreases from -0.53 to -0.51 (regularized values).</a:t>
+              <a:t>In fact, if we compute the yearly average, we can observe that the average calorie consumption very slightly decreases from -0.53 to -0.51 (regularized values).</a:t>
             </a:r>
           </a:p>
         </p:txBody>
@@ -12808,8 +12866,8 @@
         </p:nvSpPr>
         <p:spPr>
           <a:xfrm>
-            <a:off x="2404460" y="739016"/>
-            <a:ext cx="9323637" cy="646331"/>
+            <a:off x="2685032" y="739016"/>
+            <a:ext cx="8762492" cy="646331"/>
           </a:xfrm>
           <a:prstGeom prst="rect">
             <a:avLst/>
@@ -12823,12 +12881,16 @@
           <a:lstStyle/>
           <a:p>
             <a:r>
+              <a:rPr lang="en-US" i="1" dirty="0" err="1"/>
+              <a:t>FitBuddy</a:t>
+            </a:r>
+            <a:r>
               <a:rPr lang="en-US" i="1" dirty="0"/>
-              <a:t>Fitness Buddy </a:t>
+              <a:t> </a:t>
             </a:r>
             <a:r>
               <a:rPr lang="en-US" dirty="0"/>
-              <a:t>could then compute the causal influence on the variable </a:t>
+              <a:t>could then compute the causal influence of other variables on the variable </a:t>
             </a:r>
             <a:r>
               <a:rPr lang="en-US" dirty="0">
@@ -12839,7 +12901,7 @@
             </a:r>
             <a:r>
               <a:rPr lang="en-US" dirty="0"/>
-              <a:t>, as shown in the graph below.</a:t>
+              <a:t>, as shown in the graph below, to suggest the best course of action.</a:t>
             </a:r>
           </a:p>
         </p:txBody>
@@ -12890,7 +12952,7 @@
         <p:spPr>
           <a:xfrm>
             <a:off x="4673790" y="2288691"/>
-            <a:ext cx="7518210" cy="2031325"/>
+            <a:ext cx="7518210" cy="2308324"/>
           </a:xfrm>
           <a:prstGeom prst="rect">
             <a:avLst/>
@@ -12925,12 +12987,12 @@
               <a:buChar char="•"/>
             </a:pPr>
             <a:r>
-              <a:rPr lang="en-US" i="1" dirty="0"/>
-              <a:t>Fitness Buddy</a:t>
+              <a:rPr lang="en-US" i="1" dirty="0" err="1"/>
+              <a:t>FitBuddy</a:t>
             </a:r>
             <a:r>
               <a:rPr lang="en-US" dirty="0"/>
-              <a:t> could either suggest an optimal amount of training, or tell if the desired amount would be enough to reach the set goal</a:t>
+              <a:t> could either determine whether the user’s desired amount of training would be sufficient to reach the set goal or suggest an optimal amount of training to achieve it.</a:t>
             </a:r>
           </a:p>
         </p:txBody>
@@ -12985,13 +13047,13 @@
         </p:nvSpPr>
         <p:spPr>
           <a:xfrm>
-            <a:off x="5926540" y="4401878"/>
-            <a:ext cx="5874303" cy="1767427"/>
+            <a:off x="5769965" y="4567582"/>
+            <a:ext cx="6081765" cy="1676643"/>
           </a:xfrm>
           <a:prstGeom prst="wedgeRoundRectCallout">
             <a:avLst>
-              <a:gd name="adj1" fmla="val -59879"/>
-              <a:gd name="adj2" fmla="val 41631"/>
+              <a:gd name="adj1" fmla="val -56680"/>
+              <a:gd name="adj2" fmla="val 38269"/>
               <a:gd name="adj3" fmla="val 16667"/>
             </a:avLst>
           </a:prstGeom>
@@ -13231,12 +13293,16 @@
               <a:t>: The user sets a desired amount of training, and </a:t>
             </a:r>
             <a:r>
+              <a:rPr lang="en-US" i="1" dirty="0" err="1"/>
+              <a:t>FitBuddy</a:t>
+            </a:r>
+            <a:r>
               <a:rPr lang="en-US" i="1" dirty="0"/>
-              <a:t>Fitness Buddy </a:t>
+              <a:t> </a:t>
             </a:r>
             <a:r>
               <a:rPr lang="en-US" dirty="0"/>
-              <a:t>responds to determine if it would be sufficient and how close.</a:t>
+              <a:t>responds to determine if it would be sufficient to achieve the goal or how close they are to reaching it.</a:t>
             </a:r>
           </a:p>
         </p:txBody>
@@ -13306,7 +13372,7 @@
             </a:pPr>
             <a:r>
               <a:rPr lang="en-US" dirty="0"/>
-              <a:t>Increasing the training time by a comfortable amount, we can observe  a good increase in calories burned from the graph;</a:t>
+              <a:t>Increasing the training time by a comfortable amount, we can observe a significant increase in calories burned from the graph;</a:t>
             </a:r>
           </a:p>
           <a:p>
@@ -13323,7 +13389,14 @@
             </a:pPr>
             <a:r>
               <a:rPr lang="en-US" dirty="0"/>
-              <a:t>In fact, the prospective average calories consumption increased from -0.53 to -0.24 (regularized values);</a:t>
+              <a:t>In fact, the prospective average calorie consumption increased from </a:t>
+            </a:r>
+            <a:br>
+              <a:rPr lang="en-US" dirty="0"/>
+            </a:br>
+            <a:r>
+              <a:rPr lang="en-US" dirty="0"/>
+              <a:t>-0.53 to -0.24 (regularized values);</a:t>
             </a:r>
           </a:p>
           <a:p>
@@ -13622,8 +13695,8 @@
         </p:nvSpPr>
         <p:spPr>
           <a:xfrm>
-            <a:off x="2477206" y="880413"/>
-            <a:ext cx="9178144" cy="369332"/>
+            <a:off x="3119106" y="880413"/>
+            <a:ext cx="7894345" cy="369332"/>
           </a:xfrm>
           <a:prstGeom prst="rect">
             <a:avLst/>
@@ -13645,8 +13718,12 @@
               <a:t>: </a:t>
             </a:r>
             <a:r>
+              <a:rPr lang="en-US" i="1" dirty="0" err="1"/>
+              <a:t>FitBuddy</a:t>
+            </a:r>
+            <a:r>
               <a:rPr lang="en-US" i="1" dirty="0"/>
-              <a:t>Fitness Buddy </a:t>
+              <a:t> </a:t>
             </a:r>
             <a:r>
               <a:rPr lang="en-US" dirty="0"/>
@@ -13759,7 +13836,7 @@
             </a:r>
             <a:r>
               <a:rPr lang="en-US" dirty="0"/>
-              <a:t>by small amounts until we find the first value of </a:t>
+              <a:t>by small increments until we find the first value of </a:t>
             </a:r>
             <a:r>
               <a:rPr lang="en-US" dirty="0">
@@ -13770,7 +13847,7 @@
             </a:r>
             <a:r>
               <a:rPr lang="en-US" dirty="0"/>
-              <a:t>greater than or equal to the set goal and provide the answer.</a:t>
+              <a:t>that is greater than or equal to the set goal, and then provide the answer.</a:t>
             </a:r>
           </a:p>
         </p:txBody>
@@ -13952,31 +14029,51 @@
         <p:spPr/>
         <p:txBody>
           <a:bodyPr>
-            <a:normAutofit lnSpcReduction="10000"/>
+            <a:normAutofit fontScale="77500" lnSpcReduction="20000"/>
           </a:bodyPr>
           <a:lstStyle/>
           <a:p>
+            <a:pPr>
+              <a:lnSpc>
+                <a:spcPct val="130000"/>
+              </a:lnSpc>
+            </a:pPr>
             <a:r>
               <a:rPr lang="en-GB" dirty="0"/>
-              <a:t>This approach aims to show that the causal analysis approach could work for providing personalised health and fitness suggestions to users via interaction with an AI agent;</a:t>
+              <a:t>This study aims to show that the causal analysis approach can work for providing personalised health and fitness suggestions to users via interaction with an AI agent;</a:t>
             </a:r>
           </a:p>
           <a:p>
+            <a:pPr>
+              <a:lnSpc>
+                <a:spcPct val="130000"/>
+              </a:lnSpc>
+            </a:pPr>
             <a:r>
               <a:rPr lang="en-GB" dirty="0"/>
-              <a:t>At this state, it intentionally ignores some constraints, such as precautionary and realistic human limits;</a:t>
+              <a:t>At this stage, it intentionally ignores some constraints, such as precautionary and realistic human limits;</a:t>
             </a:r>
           </a:p>
           <a:p>
+            <a:pPr>
+              <a:lnSpc>
+                <a:spcPct val="130000"/>
+              </a:lnSpc>
+            </a:pPr>
             <a:r>
               <a:rPr lang="en-GB" dirty="0"/>
-              <a:t>Given the synthetic and relatively limited nature of the data available, the suggestions need to be simple and straightforward;</a:t>
+              <a:t>Given the synthetic and relatively limited nature of the data available, the suggestions currently need to be simple and straightforward;</a:t>
             </a:r>
           </a:p>
           <a:p>
+            <a:pPr>
+              <a:lnSpc>
+                <a:spcPct val="130000"/>
+              </a:lnSpc>
+            </a:pPr>
             <a:r>
               <a:rPr lang="en-GB" dirty="0"/>
-              <a:t>With larger and more realistic datasets, along with increased domain knowledge and development time, the previous limitations could be realistically overcome, leading to an efficient and functional device.</a:t>
+              <a:t>With larger and more realistic datasets, along with increased domain knowledge and development time, the previous limitations could be realistically overcome, leading to an efficient and functional approach.</a:t>
             </a:r>
           </a:p>
         </p:txBody>
@@ -14068,7 +14165,7 @@
             <a:pPr algn="ctr"/>
             <a:r>
               <a:rPr lang="en-GB" i="1" dirty="0"/>
-              <a:t>Please, don’t train 20 hours a day, if I now suggest so!</a:t>
+              <a:t>Please, don’t train 20 hours a day or walk 50km, if I now suggest so!</a:t>
             </a:r>
           </a:p>
         </p:txBody>

</xml_diff>